<commit_message>
correct united airlines text to November 2022
</commit_message>
<xml_diff>
--- a/United Airlines Historical LHR Service/annotations.pptx
+++ b/United Airlines Historical LHR Service/annotations.pptx
@@ -115,7 +115,7 @@
 <file path=ppt/revisionInfo.xml><?xml version="1.0" encoding="utf-8"?>
 <p1510:revInfo xmlns:a="http://schemas.openxmlformats.org/drawingml/2006/main" xmlns:r="http://schemas.openxmlformats.org/officeDocument/2006/relationships" xmlns:p1510="http://schemas.microsoft.com/office/powerpoint/2015/10/main">
   <p1510:revLst>
-    <p1510:client id="{E5C05D09-2F1B-47CF-B59A-0372D11C7A46}" v="4" dt="2023-05-13T21:58:19.409"/>
+    <p1510:client id="{E5C05D09-2F1B-47CF-B59A-0372D11C7A46}" v="5" dt="2023-05-14T14:58:21.235"/>
   </p1510:revLst>
 </p1510:revInfo>
 </file>
@@ -125,12 +125,12 @@
   <pc:docChgLst>
     <pc:chgData name="Alexander Elfering" userId="4911788d8c382ac3" providerId="LiveId" clId="{E5C05D09-2F1B-47CF-B59A-0372D11C7A46}"/>
     <pc:docChg chg="custSel modSld">
-      <pc:chgData name="Alexander Elfering" userId="4911788d8c382ac3" providerId="LiveId" clId="{E5C05D09-2F1B-47CF-B59A-0372D11C7A46}" dt="2023-05-13T21:58:19.408" v="33"/>
+      <pc:chgData name="Alexander Elfering" userId="4911788d8c382ac3" providerId="LiveId" clId="{E5C05D09-2F1B-47CF-B59A-0372D11C7A46}" dt="2023-05-14T14:58:24.700" v="38" actId="167"/>
       <pc:docMkLst>
         <pc:docMk/>
       </pc:docMkLst>
       <pc:sldChg chg="addSp delSp modSp mod">
-        <pc:chgData name="Alexander Elfering" userId="4911788d8c382ac3" providerId="LiveId" clId="{E5C05D09-2F1B-47CF-B59A-0372D11C7A46}" dt="2023-05-13T21:58:19.408" v="33"/>
+        <pc:chgData name="Alexander Elfering" userId="4911788d8c382ac3" providerId="LiveId" clId="{E5C05D09-2F1B-47CF-B59A-0372D11C7A46}" dt="2023-05-14T14:58:24.700" v="38" actId="167"/>
         <pc:sldMkLst>
           <pc:docMk/>
           <pc:sldMk cId="1305448620" sldId="256"/>
@@ -159,12 +159,20 @@
             <ac:spMk id="27" creationId="{A4169DC9-DA3F-570B-4372-BE26702C3771}"/>
           </ac:spMkLst>
         </pc:spChg>
-        <pc:picChg chg="add mod ord">
-          <ac:chgData name="Alexander Elfering" userId="4911788d8c382ac3" providerId="LiveId" clId="{E5C05D09-2F1B-47CF-B59A-0372D11C7A46}" dt="2023-05-13T21:57:45.774" v="30" actId="962"/>
+        <pc:picChg chg="add del mod ord">
+          <ac:chgData name="Alexander Elfering" userId="4911788d8c382ac3" providerId="LiveId" clId="{E5C05D09-2F1B-47CF-B59A-0372D11C7A46}" dt="2023-05-14T14:57:34.959" v="34" actId="478"/>
           <ac:picMkLst>
             <pc:docMk/>
             <pc:sldMk cId="1305448620" sldId="256"/>
             <ac:picMk id="3" creationId="{24C1AD2E-DF8A-85C1-94F1-D50A0F35A2D2}"/>
+          </ac:picMkLst>
+        </pc:picChg>
+        <pc:picChg chg="add mod ord">
+          <ac:chgData name="Alexander Elfering" userId="4911788d8c382ac3" providerId="LiveId" clId="{E5C05D09-2F1B-47CF-B59A-0372D11C7A46}" dt="2023-05-14T14:58:24.700" v="38" actId="167"/>
+          <ac:picMkLst>
+            <pc:docMk/>
+            <pc:sldMk cId="1305448620" sldId="256"/>
+            <ac:picMk id="5" creationId="{B19FAD42-895D-8BC0-8289-C49DF5D486D7}"/>
           </ac:picMkLst>
         </pc:picChg>
         <pc:picChg chg="del">
@@ -320,7 +328,7 @@
           <a:p>
             <a:fld id="{E9C00FFA-A93F-4610-8078-5085CEB46973}" type="datetimeFigureOut">
               <a:rPr lang="en-US" smtClean="0"/>
-              <a:t>5/13/2023</a:t>
+              <a:t>5/14/2023</a:t>
             </a:fld>
             <a:endParaRPr lang="en-US"/>
           </a:p>
@@ -490,7 +498,7 @@
           <a:p>
             <a:fld id="{E9C00FFA-A93F-4610-8078-5085CEB46973}" type="datetimeFigureOut">
               <a:rPr lang="en-US" smtClean="0"/>
-              <a:t>5/13/2023</a:t>
+              <a:t>5/14/2023</a:t>
             </a:fld>
             <a:endParaRPr lang="en-US"/>
           </a:p>
@@ -670,7 +678,7 @@
           <a:p>
             <a:fld id="{E9C00FFA-A93F-4610-8078-5085CEB46973}" type="datetimeFigureOut">
               <a:rPr lang="en-US" smtClean="0"/>
-              <a:t>5/13/2023</a:t>
+              <a:t>5/14/2023</a:t>
             </a:fld>
             <a:endParaRPr lang="en-US"/>
           </a:p>
@@ -840,7 +848,7 @@
           <a:p>
             <a:fld id="{E9C00FFA-A93F-4610-8078-5085CEB46973}" type="datetimeFigureOut">
               <a:rPr lang="en-US" smtClean="0"/>
-              <a:t>5/13/2023</a:t>
+              <a:t>5/14/2023</a:t>
             </a:fld>
             <a:endParaRPr lang="en-US"/>
           </a:p>
@@ -1086,7 +1094,7 @@
           <a:p>
             <a:fld id="{E9C00FFA-A93F-4610-8078-5085CEB46973}" type="datetimeFigureOut">
               <a:rPr lang="en-US" smtClean="0"/>
-              <a:t>5/13/2023</a:t>
+              <a:t>5/14/2023</a:t>
             </a:fld>
             <a:endParaRPr lang="en-US"/>
           </a:p>
@@ -1318,7 +1326,7 @@
           <a:p>
             <a:fld id="{E9C00FFA-A93F-4610-8078-5085CEB46973}" type="datetimeFigureOut">
               <a:rPr lang="en-US" smtClean="0"/>
-              <a:t>5/13/2023</a:t>
+              <a:t>5/14/2023</a:t>
             </a:fld>
             <a:endParaRPr lang="en-US"/>
           </a:p>
@@ -1685,7 +1693,7 @@
           <a:p>
             <a:fld id="{E9C00FFA-A93F-4610-8078-5085CEB46973}" type="datetimeFigureOut">
               <a:rPr lang="en-US" smtClean="0"/>
-              <a:t>5/13/2023</a:t>
+              <a:t>5/14/2023</a:t>
             </a:fld>
             <a:endParaRPr lang="en-US"/>
           </a:p>
@@ -1803,7 +1811,7 @@
           <a:p>
             <a:fld id="{E9C00FFA-A93F-4610-8078-5085CEB46973}" type="datetimeFigureOut">
               <a:rPr lang="en-US" smtClean="0"/>
-              <a:t>5/13/2023</a:t>
+              <a:t>5/14/2023</a:t>
             </a:fld>
             <a:endParaRPr lang="en-US"/>
           </a:p>
@@ -1898,7 +1906,7 @@
           <a:p>
             <a:fld id="{E9C00FFA-A93F-4610-8078-5085CEB46973}" type="datetimeFigureOut">
               <a:rPr lang="en-US" smtClean="0"/>
-              <a:t>5/13/2023</a:t>
+              <a:t>5/14/2023</a:t>
             </a:fld>
             <a:endParaRPr lang="en-US"/>
           </a:p>
@@ -2175,7 +2183,7 @@
           <a:p>
             <a:fld id="{E9C00FFA-A93F-4610-8078-5085CEB46973}" type="datetimeFigureOut">
               <a:rPr lang="en-US" smtClean="0"/>
-              <a:t>5/13/2023</a:t>
+              <a:t>5/14/2023</a:t>
             </a:fld>
             <a:endParaRPr lang="en-US"/>
           </a:p>
@@ -2432,7 +2440,7 @@
           <a:p>
             <a:fld id="{E9C00FFA-A93F-4610-8078-5085CEB46973}" type="datetimeFigureOut">
               <a:rPr lang="en-US" smtClean="0"/>
-              <a:t>5/13/2023</a:t>
+              <a:t>5/14/2023</a:t>
             </a:fld>
             <a:endParaRPr lang="en-US"/>
           </a:p>
@@ -2645,7 +2653,7 @@
           <a:p>
             <a:fld id="{E9C00FFA-A93F-4610-8078-5085CEB46973}" type="datetimeFigureOut">
               <a:rPr lang="en-US" smtClean="0"/>
-              <a:t>5/13/2023</a:t>
+              <a:t>5/14/2023</a:t>
             </a:fld>
             <a:endParaRPr lang="en-US"/>
           </a:p>
@@ -3052,10 +3060,10 @@
       </p:grpSpPr>
       <p:pic>
         <p:nvPicPr>
-          <p:cNvPr id="3" name="Picture 2" descr="A picture containing text, diagram, line, font&#10;&#10;Description automatically generated">
+          <p:cNvPr id="5" name="Picture 4" descr="A picture containing text, diagram, line, font&#10;&#10;Description automatically generated">
             <a:extLst>
               <a:ext uri="{FF2B5EF4-FFF2-40B4-BE49-F238E27FC236}">
-                <a16:creationId xmlns:a16="http://schemas.microsoft.com/office/drawing/2014/main" id="{24C1AD2E-DF8A-85C1-94F1-D50A0F35A2D2}"/>
+                <a16:creationId xmlns:a16="http://schemas.microsoft.com/office/drawing/2014/main" id="{B19FAD42-895D-8BC0-8289-C49DF5D486D7}"/>
               </a:ext>
             </a:extLst>
           </p:cNvPr>

</xml_diff>